<commit_message>
Ported-in AAC14, IPAC15. Ch6: fleshed out, Ch5: SC halo study, choice of FMA/operating point, Ch2: QI theory
</commit_message>
<xml_diff>
--- a/5.figures/steeringtolerance/steeringtolerance_ppt_diagrams.pptx
+++ b/5.figures/steeringtolerance/steeringtolerance_ppt_diagrams.pptx
@@ -3768,7 +3768,7 @@
                 <p:spPr>
                   <a:xfrm>
                     <a:off x="1358954" y="2456201"/>
-                    <a:ext cx="471411" cy="369332"/>
+                    <a:ext cx="489045" cy="369332"/>
                   </a:xfrm>
                   <a:prstGeom prst="rect">
                     <a:avLst/>
@@ -3782,47 +3782,46 @@
                   <a:lstStyle/>
                   <a:p>
                     <a:pPr/>
+                    <a:r>
+                      <a:rPr lang="en-US" b="0" dirty="0" smtClean="0"/>
+                      <a:t>-</a:t>
+                    </a:r>
                     <a14:m>
-                      <m:oMathPara xmlns:m="http://schemas.openxmlformats.org/officeDocument/2006/math">
-                        <m:oMathParaPr>
-                          <m:jc m:val="centerGroup"/>
-                        </m:oMathParaPr>
-                        <m:oMath xmlns:m="http://schemas.openxmlformats.org/officeDocument/2006/math">
-                          <m:sSubSup>
-                            <m:sSubSupPr>
-                              <m:ctrlPr>
-                                <a:rPr lang="en-US" b="0" i="1" smtClean="0">
-                                  <a:latin typeface="Cambria Math"/>
-                                </a:rPr>
-                              </m:ctrlPr>
-                            </m:sSubSupPr>
-                            <m:e>
-                              <m:r>
-                                <a:rPr lang="en-US" b="0" i="1" smtClean="0">
-                                  <a:latin typeface="Cambria Math"/>
-                                </a:rPr>
-                                <m:t>𝑥</m:t>
-                              </m:r>
-                            </m:e>
-                            <m:sub>
-                              <m:r>
-                                <a:rPr lang="en-US" b="0" i="1" smtClean="0">
-                                  <a:latin typeface="Cambria Math"/>
-                                </a:rPr>
-                                <m:t>𝑜</m:t>
-                              </m:r>
-                            </m:sub>
-                            <m:sup>
-                              <m:r>
-                                <a:rPr lang="en-US" b="0" i="1" smtClean="0">
-                                  <a:latin typeface="Cambria Math"/>
-                                </a:rPr>
-                                <m:t>′</m:t>
-                              </m:r>
-                            </m:sup>
-                          </m:sSubSup>
-                        </m:oMath>
-                      </m:oMathPara>
+                      <m:oMath xmlns:m="http://schemas.openxmlformats.org/officeDocument/2006/math">
+                        <m:sSubSup>
+                          <m:sSubSupPr>
+                            <m:ctrlPr>
+                              <a:rPr lang="en-US" b="0" i="1" smtClean="0">
+                                <a:latin typeface="Cambria Math"/>
+                              </a:rPr>
+                            </m:ctrlPr>
+                          </m:sSubSupPr>
+                          <m:e>
+                            <m:r>
+                              <a:rPr lang="en-US" b="0" i="1" smtClean="0">
+                                <a:latin typeface="Cambria Math"/>
+                              </a:rPr>
+                              <m:t>𝑥</m:t>
+                            </m:r>
+                          </m:e>
+                          <m:sub>
+                            <m:r>
+                              <a:rPr lang="en-US" b="0" i="1" smtClean="0">
+                                <a:latin typeface="Cambria Math"/>
+                              </a:rPr>
+                              <m:t>𝑜</m:t>
+                            </m:r>
+                          </m:sub>
+                          <m:sup>
+                            <m:r>
+                              <a:rPr lang="en-US" b="0" i="1" smtClean="0">
+                                <a:latin typeface="Cambria Math"/>
+                              </a:rPr>
+                              <m:t>′</m:t>
+                            </m:r>
+                          </m:sup>
+                        </m:sSubSup>
+                      </m:oMath>
                     </a14:m>
                     <a:endParaRPr lang="en-US" dirty="0"/>
                   </a:p>
@@ -3841,7 +3840,7 @@
                 <p:spPr>
                   <a:xfrm>
                     <a:off x="1358954" y="2456201"/>
-                    <a:ext cx="471411" cy="369332"/>
+                    <a:ext cx="489045" cy="369332"/>
                   </a:xfrm>
                   <a:prstGeom prst="rect">
                     <a:avLst/>
@@ -3849,7 +3848,7 @@
                   <a:blipFill rotWithShape="1">
                     <a:blip r:embed="rId3"/>
                     <a:stretch>
-                      <a:fillRect/>
+                      <a:fillRect l="-11250" t="-8197" b="-24590"/>
                     </a:stretch>
                   </a:blipFill>
                 </p:spPr>
@@ -4925,7 +4924,7 @@
                   </a:prstGeom>
                   <a:ln w="38100">
                     <a:solidFill>
-                      <a:srgbClr val="FF0000"/>
+                      <a:schemeClr val="tx1"/>
                     </a:solidFill>
                     <a:tailEnd type="arrow"/>
                   </a:ln>
@@ -5005,6 +5004,12 @@
                   <a:prstGeom prst="line">
                     <a:avLst/>
                   </a:prstGeom>
+                  <a:ln>
+                    <a:solidFill>
+                      <a:schemeClr val="tx1"/>
+                    </a:solidFill>
+                    <a:prstDash val="dash"/>
+                  </a:ln>
                 </p:spPr>
                 <p:style>
                   <a:lnRef idx="1">
@@ -5036,6 +5041,12 @@
                 <a:prstGeom prst="line">
                   <a:avLst/>
                 </a:prstGeom>
+                <a:ln>
+                  <a:solidFill>
+                    <a:schemeClr val="tx1"/>
+                  </a:solidFill>
+                  <a:prstDash val="dash"/>
+                </a:ln>
               </p:spPr>
               <p:style>
                 <a:lnRef idx="1">
@@ -5253,7 +5264,7 @@
               </a:prstGeom>
               <a:ln w="38100">
                 <a:solidFill>
-                  <a:schemeClr val="tx1"/>
+                  <a:srgbClr val="FF0000"/>
                 </a:solidFill>
                 <a:tailEnd type="arrow"/>
               </a:ln>
@@ -5289,7 +5300,7 @@
               </a:prstGeom>
               <a:ln w="38100">
                 <a:solidFill>
-                  <a:schemeClr val="tx1"/>
+                  <a:srgbClr val="FF0000"/>
                 </a:solidFill>
                 <a:tailEnd type="arrow"/>
               </a:ln>
@@ -5325,7 +5336,7 @@
               </a:prstGeom>
               <a:ln w="38100">
                 <a:solidFill>
-                  <a:schemeClr val="tx1"/>
+                  <a:srgbClr val="FF0000"/>
                 </a:solidFill>
                 <a:tailEnd type="arrow"/>
               </a:ln>
@@ -5361,7 +5372,7 @@
               </a:prstGeom>
               <a:ln w="38100">
                 <a:solidFill>
-                  <a:schemeClr val="tx1"/>
+                  <a:srgbClr val="FF0000"/>
                 </a:solidFill>
                 <a:tailEnd type="arrow"/>
               </a:ln>
@@ -5501,7 +5512,7 @@
             </a:prstGeom>
             <a:ln w="38100">
               <a:solidFill>
-                <a:srgbClr val="FF0000"/>
+                <a:schemeClr val="tx1"/>
               </a:solidFill>
               <a:tailEnd type="arrow"/>
             </a:ln>
@@ -5572,7 +5583,7 @@
             </a:prstGeom>
             <a:ln w="38100">
               <a:solidFill>
-                <a:srgbClr val="FF0000"/>
+                <a:schemeClr val="tx1"/>
               </a:solidFill>
               <a:tailEnd type="arrow"/>
             </a:ln>

</xml_diff>